<commit_message>
replaced hit-by-bus title with lottery winner and added photo of Weirs
</commit_message>
<xml_diff>
--- a/instructors/01-Why_are_we_here.pptx
+++ b/instructors/01-Why_are_we_here.pptx
@@ -220,7 +220,7 @@
           <a:p>
             <a:fld id="{B1D4AFAA-5545-4348-866E-082827204B28}" type="datetimeFigureOut">
               <a:rPr lang="en-GB" smtClean="0"/>
-              <a:t>21/07/2022</a:t>
+              <a:t>08/08/2022</a:t>
             </a:fld>
             <a:endParaRPr lang="en-GB"/>
           </a:p>
@@ -569,6 +569,98 @@
 </p:notes>
 </file>
 
+<file path=ppt/notesSlides/notesSlide2.xml><?xml version="1.0" encoding="utf-8"?>
+<p:notes xmlns:a="http://schemas.openxmlformats.org/drawingml/2006/main" xmlns:r="http://schemas.openxmlformats.org/officeDocument/2006/relationships" xmlns:p="http://schemas.openxmlformats.org/presentationml/2006/main">
+  <p:cSld>
+    <p:spTree>
+      <p:nvGrpSpPr>
+        <p:cNvPr id="1" name=""/>
+        <p:cNvGrpSpPr/>
+        <p:nvPr/>
+      </p:nvGrpSpPr>
+      <p:grpSpPr>
+        <a:xfrm>
+          <a:off x="0" y="0"/>
+          <a:ext cx="0" cy="0"/>
+          <a:chOff x="0" y="0"/>
+          <a:chExt cx="0" cy="0"/>
+        </a:xfrm>
+      </p:grpSpPr>
+      <p:sp>
+        <p:nvSpPr>
+          <p:cNvPr id="2" name="Slide Image Placeholder 1"/>
+          <p:cNvSpPr>
+            <a:spLocks noGrp="1" noRot="1" noChangeAspect="1"/>
+          </p:cNvSpPr>
+          <p:nvPr>
+            <p:ph type="sldImg"/>
+          </p:nvPr>
+        </p:nvSpPr>
+        <p:spPr/>
+      </p:sp>
+      <p:sp>
+        <p:nvSpPr>
+          <p:cNvPr id="3" name="Notes Placeholder 2"/>
+          <p:cNvSpPr>
+            <a:spLocks noGrp="1"/>
+          </p:cNvSpPr>
+          <p:nvPr>
+            <p:ph type="body" idx="1"/>
+          </p:nvPr>
+        </p:nvSpPr>
+        <p:spPr/>
+        <p:txBody>
+          <a:bodyPr/>
+          <a:lstStyle/>
+          <a:p>
+            <a:r>
+              <a:rPr lang="en-GB" smtClean="0"/>
+              <a:t>Colin and Chris Weir are a Scottish couple who won</a:t>
+            </a:r>
+            <a:r>
+              <a:rPr lang="en-GB" baseline="0" smtClean="0"/>
+              <a:t> a life-changing sum of money in the national lottery. Would your postdoc come back into work if they hit the jackpot? </a:t>
+            </a:r>
+            <a:endParaRPr lang="en-GB"/>
+          </a:p>
+        </p:txBody>
+      </p:sp>
+      <p:sp>
+        <p:nvSpPr>
+          <p:cNvPr id="4" name="Slide Number Placeholder 3"/>
+          <p:cNvSpPr>
+            <a:spLocks noGrp="1"/>
+          </p:cNvSpPr>
+          <p:nvPr>
+            <p:ph type="sldNum" sz="quarter" idx="10"/>
+          </p:nvPr>
+        </p:nvSpPr>
+        <p:spPr/>
+        <p:txBody>
+          <a:bodyPr/>
+          <a:lstStyle/>
+          <a:p>
+            <a:fld id="{ECFFB44E-D000-426C-9F9B-769AE7CC186C}" type="slidenum">
+              <a:rPr lang="en-GB" smtClean="0"/>
+              <a:t>21</a:t>
+            </a:fld>
+            <a:endParaRPr lang="en-GB"/>
+          </a:p>
+        </p:txBody>
+      </p:sp>
+    </p:spTree>
+    <p:extLst>
+      <p:ext uri="{BB962C8B-B14F-4D97-AF65-F5344CB8AC3E}">
+        <p14:creationId xmlns:p14="http://schemas.microsoft.com/office/powerpoint/2010/main" val="3909621395"/>
+      </p:ext>
+    </p:extLst>
+  </p:cSld>
+  <p:clrMapOvr>
+    <a:masterClrMapping/>
+  </p:clrMapOvr>
+</p:notes>
+</file>
+
 <file path=ppt/slideLayouts/slideLayout1.xml><?xml version="1.0" encoding="utf-8"?>
 <p:sldLayout xmlns:a="http://schemas.openxmlformats.org/drawingml/2006/main" xmlns:r="http://schemas.openxmlformats.org/officeDocument/2006/relationships" xmlns:p="http://schemas.openxmlformats.org/presentationml/2006/main" type="title" preserve="1">
   <p:cSld name="Title Slide">
@@ -700,7 +792,7 @@
           <a:p>
             <a:fld id="{CC29EC85-173F-467E-B364-65AD14726A23}" type="datetimeFigureOut">
               <a:rPr lang="en-GB" smtClean="0"/>
-              <a:t>21/07/2022</a:t>
+              <a:t>08/08/2022</a:t>
             </a:fld>
             <a:endParaRPr lang="en-GB"/>
           </a:p>
@@ -917,7 +1009,7 @@
           <a:p>
             <a:fld id="{CC29EC85-173F-467E-B364-65AD14726A23}" type="datetimeFigureOut">
               <a:rPr lang="en-GB" smtClean="0"/>
-              <a:t>21/07/2022</a:t>
+              <a:t>08/08/2022</a:t>
             </a:fld>
             <a:endParaRPr lang="en-GB"/>
           </a:p>
@@ -1097,7 +1189,7 @@
           <a:p>
             <a:fld id="{CC29EC85-173F-467E-B364-65AD14726A23}" type="datetimeFigureOut">
               <a:rPr lang="en-GB" smtClean="0"/>
-              <a:t>21/07/2022</a:t>
+              <a:t>08/08/2022</a:t>
             </a:fld>
             <a:endParaRPr lang="en-GB"/>
           </a:p>
@@ -1460,7 +1552,7 @@
           <a:p>
             <a:fld id="{CC29EC85-173F-467E-B364-65AD14726A23}" type="datetimeFigureOut">
               <a:rPr lang="en-GB" smtClean="0"/>
-              <a:t>21/07/2022</a:t>
+              <a:t>08/08/2022</a:t>
             </a:fld>
             <a:endParaRPr lang="en-GB"/>
           </a:p>
@@ -1706,7 +1798,7 @@
           <a:p>
             <a:fld id="{CC29EC85-173F-467E-B364-65AD14726A23}" type="datetimeFigureOut">
               <a:rPr lang="en-GB" smtClean="0"/>
-              <a:t>21/07/2022</a:t>
+              <a:t>08/08/2022</a:t>
             </a:fld>
             <a:endParaRPr lang="en-GB"/>
           </a:p>
@@ -1938,7 +2030,7 @@
           <a:p>
             <a:fld id="{CC29EC85-173F-467E-B364-65AD14726A23}" type="datetimeFigureOut">
               <a:rPr lang="en-GB" smtClean="0"/>
-              <a:t>21/07/2022</a:t>
+              <a:t>08/08/2022</a:t>
             </a:fld>
             <a:endParaRPr lang="en-GB"/>
           </a:p>
@@ -2305,7 +2397,7 @@
           <a:p>
             <a:fld id="{CC29EC85-173F-467E-B364-65AD14726A23}" type="datetimeFigureOut">
               <a:rPr lang="en-GB" smtClean="0"/>
-              <a:t>21/07/2022</a:t>
+              <a:t>08/08/2022</a:t>
             </a:fld>
             <a:endParaRPr lang="en-GB"/>
           </a:p>
@@ -2423,7 +2515,7 @@
           <a:p>
             <a:fld id="{CC29EC85-173F-467E-B364-65AD14726A23}" type="datetimeFigureOut">
               <a:rPr lang="en-GB" smtClean="0"/>
-              <a:t>21/07/2022</a:t>
+              <a:t>08/08/2022</a:t>
             </a:fld>
             <a:endParaRPr lang="en-GB"/>
           </a:p>
@@ -2518,7 +2610,7 @@
           <a:p>
             <a:fld id="{CC29EC85-173F-467E-B364-65AD14726A23}" type="datetimeFigureOut">
               <a:rPr lang="en-GB" smtClean="0"/>
-              <a:t>21/07/2022</a:t>
+              <a:t>08/08/2022</a:t>
             </a:fld>
             <a:endParaRPr lang="en-GB"/>
           </a:p>
@@ -2795,7 +2887,7 @@
           <a:p>
             <a:fld id="{CC29EC85-173F-467E-B364-65AD14726A23}" type="datetimeFigureOut">
               <a:rPr lang="en-GB" smtClean="0"/>
-              <a:t>21/07/2022</a:t>
+              <a:t>08/08/2022</a:t>
             </a:fld>
             <a:endParaRPr lang="en-GB"/>
           </a:p>
@@ -3048,7 +3140,7 @@
           <a:p>
             <a:fld id="{CC29EC85-173F-467E-B364-65AD14726A23}" type="datetimeFigureOut">
               <a:rPr lang="en-GB" smtClean="0"/>
-              <a:t>21/07/2022</a:t>
+              <a:t>08/08/2022</a:t>
             </a:fld>
             <a:endParaRPr lang="en-GB"/>
           </a:p>
@@ -3260,7 +3352,7 @@
             <a:fld id="{CC29EC85-173F-467E-B364-65AD14726A23}" type="datetimeFigureOut">
               <a:rPr lang="en-GB" smtClean="0"/>
               <a:pPr/>
-              <a:t>21/07/2022</a:t>
+              <a:t>08/08/2022</a:t>
             </a:fld>
             <a:endParaRPr lang="en-GB"/>
           </a:p>
@@ -5045,7 +5137,7 @@
             <a:effectLst/>
             <a:extLst>
               <a:ext uri="{AF507438-7753-43e0-B8FC-AC1667EBCBE1}">
-                <a14:hiddenEffects xmlns="" xmlns:a14="http://schemas.microsoft.com/office/drawing/2010/main">
+                <a14:hiddenEffects xmlns:a14="http://schemas.microsoft.com/office/drawing/2010/main" xmlns="">
                   <a:effectLst>
                     <a:outerShdw dist="35921" dir="2700000" algn="ctr" rotWithShape="0">
                       <a:schemeClr val="bg2"/>
@@ -5107,7 +5199,7 @@
             <a:effectLst/>
             <a:extLst>
               <a:ext uri="{AF507438-7753-43e0-B8FC-AC1667EBCBE1}">
-                <a14:hiddenEffects xmlns="" xmlns:a14="http://schemas.microsoft.com/office/drawing/2010/main">
+                <a14:hiddenEffects xmlns:a14="http://schemas.microsoft.com/office/drawing/2010/main" xmlns="">
                   <a:effectLst>
                     <a:outerShdw dist="35921" dir="2700000" algn="ctr" rotWithShape="0">
                       <a:schemeClr val="bg2"/>
@@ -5169,7 +5261,7 @@
             <a:effectLst/>
             <a:extLst>
               <a:ext uri="{AF507438-7753-43e0-B8FC-AC1667EBCBE1}">
-                <a14:hiddenEffects xmlns="" xmlns:a14="http://schemas.microsoft.com/office/drawing/2010/main">
+                <a14:hiddenEffects xmlns:a14="http://schemas.microsoft.com/office/drawing/2010/main" xmlns="">
                   <a:effectLst>
                     <a:outerShdw dist="35921" dir="2700000" algn="ctr" rotWithShape="0">
                       <a:schemeClr val="bg2"/>
@@ -5375,7 +5467,7 @@
           <a:effectLst/>
           <a:extLst>
             <a:ext uri="{AF507438-7753-43e0-B8FC-AC1667EBCBE1}">
-              <a14:hiddenEffects xmlns="" xmlns:a14="http://schemas.microsoft.com/office/drawing/2010/main">
+              <a14:hiddenEffects xmlns:a14="http://schemas.microsoft.com/office/drawing/2010/main" xmlns="">
                 <a:effectLst>
                   <a:outerShdw dist="35921" dir="2700000" algn="ctr" rotWithShape="0">
                     <a:schemeClr val="bg2"/>
@@ -5706,7 +5798,7 @@
             <a:effectLst/>
             <a:extLst>
               <a:ext uri="{AF507438-7753-43e0-B8FC-AC1667EBCBE1}">
-                <a14:hiddenEffects xmlns="" xmlns:a14="http://schemas.microsoft.com/office/drawing/2010/main">
+                <a14:hiddenEffects xmlns:a14="http://schemas.microsoft.com/office/drawing/2010/main" xmlns="">
                   <a:effectLst>
                     <a:outerShdw dist="35921" dir="2700000" algn="ctr" rotWithShape="0">
                       <a:schemeClr val="bg2"/>
@@ -5768,7 +5860,7 @@
             <a:effectLst/>
             <a:extLst>
               <a:ext uri="{AF507438-7753-43e0-B8FC-AC1667EBCBE1}">
-                <a14:hiddenEffects xmlns="" xmlns:a14="http://schemas.microsoft.com/office/drawing/2010/main">
+                <a14:hiddenEffects xmlns:a14="http://schemas.microsoft.com/office/drawing/2010/main" xmlns="">
                   <a:effectLst>
                     <a:outerShdw dist="35921" dir="2700000" algn="ctr" rotWithShape="0">
                       <a:schemeClr val="bg2"/>
@@ -5845,7 +5937,7 @@
             <a:effectLst/>
             <a:extLst>
               <a:ext uri="{AF507438-7753-43e0-B8FC-AC1667EBCBE1}">
-                <a14:hiddenEffects xmlns="" xmlns:a14="http://schemas.microsoft.com/office/drawing/2010/main">
+                <a14:hiddenEffects xmlns:a14="http://schemas.microsoft.com/office/drawing/2010/main" xmlns="">
                   <a:effectLst>
                     <a:outerShdw dist="35921" dir="2700000" algn="ctr" rotWithShape="0">
                       <a:schemeClr val="bg2"/>
@@ -5907,7 +5999,7 @@
             <a:effectLst/>
             <a:extLst>
               <a:ext uri="{AF507438-7753-43e0-B8FC-AC1667EBCBE1}">
-                <a14:hiddenEffects xmlns="" xmlns:a14="http://schemas.microsoft.com/office/drawing/2010/main">
+                <a14:hiddenEffects xmlns:a14="http://schemas.microsoft.com/office/drawing/2010/main" xmlns="">
                   <a:effectLst>
                     <a:outerShdw dist="35921" dir="2700000" algn="ctr" rotWithShape="0">
                       <a:schemeClr val="bg2"/>
@@ -7140,7 +7232,7 @@
           <a:effectLst/>
           <a:extLst>
             <a:ext uri="{AF507438-7753-43e0-B8FC-AC1667EBCBE1}">
-              <a14:hiddenEffects xmlns="" xmlns:a14="http://schemas.microsoft.com/office/drawing/2010/main">
+              <a14:hiddenEffects xmlns:a14="http://schemas.microsoft.com/office/drawing/2010/main" xmlns="">
                 <a:effectLst>
                   <a:outerShdw dist="35921" dir="2700000" algn="ctr" rotWithShape="0">
                     <a:schemeClr val="bg2"/>
@@ -9647,8 +9739,8 @@
           <a:lstStyle/>
           <a:p>
             <a:r>
-              <a:rPr lang="en-GB" dirty="0" smtClean="0"/>
-              <a:t>Hit by bus</a:t>
+              <a:rPr lang="en-GB" smtClean="0"/>
+              <a:t>Exercise – lottery winner</a:t>
             </a:r>
             <a:endParaRPr lang="en-GB" dirty="0"/>
           </a:p>
@@ -9682,6 +9774,48 @@
           </a:p>
         </p:txBody>
       </p:sp>
+      <p:pic>
+        <p:nvPicPr>
+          <p:cNvPr id="4" name="Picture 3" descr="Top 5 Biggest Lottery Wins Ever"/>
+          <p:cNvPicPr>
+            <a:picLocks noChangeAspect="1"/>
+          </p:cNvPicPr>
+          <p:nvPr/>
+        </p:nvPicPr>
+        <p:blipFill>
+          <a:blip r:embed="rId3">
+            <a:extLst>
+              <a:ext uri="{28A0092B-C50C-407E-A947-70E740481C1C}">
+                <a14:useLocalDpi xmlns:a14="http://schemas.microsoft.com/office/drawing/2010/main" val="0"/>
+              </a:ext>
+            </a:extLst>
+          </a:blip>
+          <a:stretch>
+            <a:fillRect/>
+          </a:stretch>
+        </p:blipFill>
+        <p:spPr>
+          <a:xfrm>
+            <a:off x="3075709" y="1825625"/>
+            <a:ext cx="5807363" cy="4227760"/>
+          </a:xfrm>
+          <a:prstGeom prst="rect">
+            <a:avLst/>
+          </a:prstGeom>
+          <a:ln w="228600" cap="sq" cmpd="thickThin">
+            <a:solidFill>
+              <a:srgbClr val="000000"/>
+            </a:solidFill>
+            <a:prstDash val="solid"/>
+            <a:miter lim="800000"/>
+          </a:ln>
+          <a:effectLst>
+            <a:innerShdw blurRad="76200">
+              <a:srgbClr val="000000"/>
+            </a:innerShdw>
+          </a:effectLst>
+        </p:spPr>
+      </p:pic>
     </p:spTree>
     <p:extLst>
       <p:ext uri="{BB962C8B-B14F-4D97-AF65-F5344CB8AC3E}">
@@ -9735,8 +9869,8 @@
           <a:lstStyle/>
           <a:p>
             <a:r>
-              <a:rPr lang="en-GB" dirty="0" smtClean="0"/>
-              <a:t>Hit by bus</a:t>
+              <a:rPr lang="en-GB" smtClean="0"/>
+              <a:t>Lottery winner exercise - conclusions</a:t>
             </a:r>
             <a:endParaRPr lang="en-GB" dirty="0"/>
           </a:p>
@@ -11163,7 +11297,7 @@
                 <a14:useLocalDpi xmlns:a14="http://schemas.microsoft.com/office/drawing/2010/main" val="0"/>
               </a:ext>
               <a:ext uri="{96DAC541-7B7A-43D3-8B79-37D633B846F1}">
-                <asvg:svgBlip xmlns="" xmlns:asvg="http://schemas.microsoft.com/office/drawing/2016/SVG/main" r:embed="rId3"/>
+                <asvg:svgBlip xmlns:asvg="http://schemas.microsoft.com/office/drawing/2016/SVG/main" xmlns="" r:embed="rId3"/>
               </a:ext>
             </a:extLst>
           </a:blip>
@@ -11202,7 +11336,7 @@
                 <a14:useLocalDpi xmlns:a14="http://schemas.microsoft.com/office/drawing/2010/main" val="0"/>
               </a:ext>
               <a:ext uri="{96DAC541-7B7A-43D3-8B79-37D633B846F1}">
-                <asvg:svgBlip xmlns="" xmlns:asvg="http://schemas.microsoft.com/office/drawing/2016/SVG/main" r:embed="rId5"/>
+                <asvg:svgBlip xmlns:asvg="http://schemas.microsoft.com/office/drawing/2016/SVG/main" xmlns="" r:embed="rId5"/>
               </a:ext>
             </a:extLst>
           </a:blip>
@@ -11241,7 +11375,7 @@
                 <a14:useLocalDpi xmlns:a14="http://schemas.microsoft.com/office/drawing/2010/main" val="0"/>
               </a:ext>
               <a:ext uri="{96DAC541-7B7A-43D3-8B79-37D633B846F1}">
-                <asvg:svgBlip xmlns="" xmlns:asvg="http://schemas.microsoft.com/office/drawing/2016/SVG/main" r:embed="rId7"/>
+                <asvg:svgBlip xmlns:asvg="http://schemas.microsoft.com/office/drawing/2016/SVG/main" xmlns="" r:embed="rId7"/>
               </a:ext>
             </a:extLst>
           </a:blip>
@@ -11280,7 +11414,7 @@
                 <a14:useLocalDpi xmlns:a14="http://schemas.microsoft.com/office/drawing/2010/main" val="0"/>
               </a:ext>
               <a:ext uri="{96DAC541-7B7A-43D3-8B79-37D633B846F1}">
-                <asvg:svgBlip xmlns="" xmlns:asvg="http://schemas.microsoft.com/office/drawing/2016/SVG/main" r:embed="rId9"/>
+                <asvg:svgBlip xmlns:asvg="http://schemas.microsoft.com/office/drawing/2016/SVG/main" xmlns="" r:embed="rId9"/>
               </a:ext>
             </a:extLst>
           </a:blip>
@@ -11319,7 +11453,7 @@
                 <a14:useLocalDpi xmlns:a14="http://schemas.microsoft.com/office/drawing/2010/main" val="0"/>
               </a:ext>
               <a:ext uri="{96DAC541-7B7A-43D3-8B79-37D633B846F1}">
-                <asvg:svgBlip xmlns="" xmlns:asvg="http://schemas.microsoft.com/office/drawing/2016/SVG/main" r:embed="rId11"/>
+                <asvg:svgBlip xmlns:asvg="http://schemas.microsoft.com/office/drawing/2016/SVG/main" xmlns="" r:embed="rId11"/>
               </a:ext>
             </a:extLst>
           </a:blip>
@@ -11358,7 +11492,7 @@
                 <a14:useLocalDpi xmlns:a14="http://schemas.microsoft.com/office/drawing/2010/main" val="0"/>
               </a:ext>
               <a:ext uri="{96DAC541-7B7A-43D3-8B79-37D633B846F1}">
-                <asvg:svgBlip xmlns="" xmlns:asvg="http://schemas.microsoft.com/office/drawing/2016/SVG/main" r:embed="rId13"/>
+                <asvg:svgBlip xmlns:asvg="http://schemas.microsoft.com/office/drawing/2016/SVG/main" xmlns="" r:embed="rId13"/>
               </a:ext>
             </a:extLst>
           </a:blip>
@@ -11722,7 +11856,7 @@
                 <a14:useLocalDpi xmlns:a14="http://schemas.microsoft.com/office/drawing/2010/main" val="0"/>
               </a:ext>
               <a:ext uri="{96DAC541-7B7A-43D3-8B79-37D633B846F1}">
-                <asvg:svgBlip xmlns="" xmlns:asvg="http://schemas.microsoft.com/office/drawing/2016/SVG/main" r:embed="rId3"/>
+                <asvg:svgBlip xmlns:asvg="http://schemas.microsoft.com/office/drawing/2016/SVG/main" xmlns="" r:embed="rId3"/>
               </a:ext>
             </a:extLst>
           </a:blip>
@@ -11937,7 +12071,7 @@
                 <a14:useLocalDpi xmlns:a14="http://schemas.microsoft.com/office/drawing/2010/main" val="0"/>
               </a:ext>
               <a:ext uri="{96DAC541-7B7A-43D3-8B79-37D633B846F1}">
-                <asvg:svgBlip xmlns="" xmlns:asvg="http://schemas.microsoft.com/office/drawing/2016/SVG/main" r:embed="rId3"/>
+                <asvg:svgBlip xmlns:asvg="http://schemas.microsoft.com/office/drawing/2016/SVG/main" xmlns="" r:embed="rId3"/>
               </a:ext>
             </a:extLst>
           </a:blip>

</xml_diff>

<commit_message>
Added link to etherpad on powerpoint prezs, each first slide
</commit_message>
<xml_diff>
--- a/instructors/01-Why_are_we_here.pptx
+++ b/instructors/01-Why_are_we_here.pptx
@@ -220,7 +220,7 @@
           <a:p>
             <a:fld id="{B1D4AFAA-5545-4348-866E-082827204B28}" type="datetimeFigureOut">
               <a:rPr lang="en-GB" smtClean="0"/>
-              <a:t>08/08/2022</a:t>
+              <a:t>22/08/2022</a:t>
             </a:fld>
             <a:endParaRPr lang="en-GB"/>
           </a:p>
@@ -792,7 +792,7 @@
           <a:p>
             <a:fld id="{CC29EC85-173F-467E-B364-65AD14726A23}" type="datetimeFigureOut">
               <a:rPr lang="en-GB" smtClean="0"/>
-              <a:t>08/08/2022</a:t>
+              <a:t>22/08/2022</a:t>
             </a:fld>
             <a:endParaRPr lang="en-GB"/>
           </a:p>
@@ -1009,7 +1009,7 @@
           <a:p>
             <a:fld id="{CC29EC85-173F-467E-B364-65AD14726A23}" type="datetimeFigureOut">
               <a:rPr lang="en-GB" smtClean="0"/>
-              <a:t>08/08/2022</a:t>
+              <a:t>22/08/2022</a:t>
             </a:fld>
             <a:endParaRPr lang="en-GB"/>
           </a:p>
@@ -1189,7 +1189,7 @@
           <a:p>
             <a:fld id="{CC29EC85-173F-467E-B364-65AD14726A23}" type="datetimeFigureOut">
               <a:rPr lang="en-GB" smtClean="0"/>
-              <a:t>08/08/2022</a:t>
+              <a:t>22/08/2022</a:t>
             </a:fld>
             <a:endParaRPr lang="en-GB"/>
           </a:p>
@@ -1552,7 +1552,7 @@
           <a:p>
             <a:fld id="{CC29EC85-173F-467E-B364-65AD14726A23}" type="datetimeFigureOut">
               <a:rPr lang="en-GB" smtClean="0"/>
-              <a:t>08/08/2022</a:t>
+              <a:t>22/08/2022</a:t>
             </a:fld>
             <a:endParaRPr lang="en-GB"/>
           </a:p>
@@ -1798,7 +1798,7 @@
           <a:p>
             <a:fld id="{CC29EC85-173F-467E-B364-65AD14726A23}" type="datetimeFigureOut">
               <a:rPr lang="en-GB" smtClean="0"/>
-              <a:t>08/08/2022</a:t>
+              <a:t>22/08/2022</a:t>
             </a:fld>
             <a:endParaRPr lang="en-GB"/>
           </a:p>
@@ -2030,7 +2030,7 @@
           <a:p>
             <a:fld id="{CC29EC85-173F-467E-B364-65AD14726A23}" type="datetimeFigureOut">
               <a:rPr lang="en-GB" smtClean="0"/>
-              <a:t>08/08/2022</a:t>
+              <a:t>22/08/2022</a:t>
             </a:fld>
             <a:endParaRPr lang="en-GB"/>
           </a:p>
@@ -2397,7 +2397,7 @@
           <a:p>
             <a:fld id="{CC29EC85-173F-467E-B364-65AD14726A23}" type="datetimeFigureOut">
               <a:rPr lang="en-GB" smtClean="0"/>
-              <a:t>08/08/2022</a:t>
+              <a:t>22/08/2022</a:t>
             </a:fld>
             <a:endParaRPr lang="en-GB"/>
           </a:p>
@@ -2515,7 +2515,7 @@
           <a:p>
             <a:fld id="{CC29EC85-173F-467E-B364-65AD14726A23}" type="datetimeFigureOut">
               <a:rPr lang="en-GB" smtClean="0"/>
-              <a:t>08/08/2022</a:t>
+              <a:t>22/08/2022</a:t>
             </a:fld>
             <a:endParaRPr lang="en-GB"/>
           </a:p>
@@ -2610,7 +2610,7 @@
           <a:p>
             <a:fld id="{CC29EC85-173F-467E-B364-65AD14726A23}" type="datetimeFigureOut">
               <a:rPr lang="en-GB" smtClean="0"/>
-              <a:t>08/08/2022</a:t>
+              <a:t>22/08/2022</a:t>
             </a:fld>
             <a:endParaRPr lang="en-GB"/>
           </a:p>
@@ -2887,7 +2887,7 @@
           <a:p>
             <a:fld id="{CC29EC85-173F-467E-B364-65AD14726A23}" type="datetimeFigureOut">
               <a:rPr lang="en-GB" smtClean="0"/>
-              <a:t>08/08/2022</a:t>
+              <a:t>22/08/2022</a:t>
             </a:fld>
             <a:endParaRPr lang="en-GB"/>
           </a:p>
@@ -3140,7 +3140,7 @@
           <a:p>
             <a:fld id="{CC29EC85-173F-467E-B364-65AD14726A23}" type="datetimeFigureOut">
               <a:rPr lang="en-GB" smtClean="0"/>
-              <a:t>08/08/2022</a:t>
+              <a:t>22/08/2022</a:t>
             </a:fld>
             <a:endParaRPr lang="en-GB"/>
           </a:p>
@@ -3352,7 +3352,7 @@
             <a:fld id="{CC29EC85-173F-467E-B364-65AD14726A23}" type="datetimeFigureOut">
               <a:rPr lang="en-GB" smtClean="0"/>
               <a:pPr/>
-              <a:t>08/08/2022</a:t>
+              <a:t>22/08/2022</a:t>
             </a:fld>
             <a:endParaRPr lang="en-GB"/>
           </a:p>
@@ -3844,6 +3844,117 @@
           </a:p>
         </p:txBody>
       </p:sp>
+      <p:grpSp>
+        <p:nvGrpSpPr>
+          <p:cNvPr id="6" name="Group 5"/>
+          <p:cNvGrpSpPr/>
+          <p:nvPr/>
+        </p:nvGrpSpPr>
+        <p:grpSpPr>
+          <a:xfrm>
+            <a:off x="335498" y="5785681"/>
+            <a:ext cx="7747345" cy="469783"/>
+            <a:chOff x="335498" y="5785681"/>
+            <a:chExt cx="7747345" cy="469783"/>
+          </a:xfrm>
+        </p:grpSpPr>
+        <p:sp>
+          <p:nvSpPr>
+            <p:cNvPr id="7" name="TextBox 6">
+              <a:extLst>
+                <a:ext uri="{FF2B5EF4-FFF2-40B4-BE49-F238E27FC236}">
+                  <a16:creationId xmlns:a16="http://schemas.microsoft.com/office/drawing/2014/main" id="{441D6036-BCDA-4EC7-9653-F205FE226493}"/>
+                </a:ext>
+              </a:extLst>
+            </p:cNvPr>
+            <p:cNvSpPr txBox="1"/>
+            <p:nvPr/>
+          </p:nvSpPr>
+          <p:spPr>
+            <a:xfrm>
+              <a:off x="1092764" y="5835907"/>
+              <a:ext cx="6990079" cy="369332"/>
+            </a:xfrm>
+            <a:prstGeom prst="rect">
+              <a:avLst/>
+            </a:prstGeom>
+            <a:noFill/>
+          </p:spPr>
+          <p:txBody>
+            <a:bodyPr wrap="square">
+              <a:spAutoFit/>
+            </a:bodyPr>
+            <a:lstStyle/>
+            <a:p>
+              <a:r>
+                <a:rPr lang="en-GB"/>
+                <a:t>Open </a:t>
+              </a:r>
+              <a:r>
+                <a:rPr lang="en-GB" smtClean="0">
+                  <a:hlinkClick r:id="rId2"/>
+                </a:rPr>
+                <a:t>https://pad.carpentries.org/fair-4-leaders-begins-20YY-MM-DD</a:t>
+              </a:r>
+              <a:r>
+                <a:rPr lang="en-GB" smtClean="0"/>
+                <a:t>  </a:t>
+              </a:r>
+              <a:endParaRPr lang="en-GB" dirty="0">
+                <a:highlight>
+                  <a:srgbClr val="FFFF00"/>
+                </a:highlight>
+              </a:endParaRPr>
+            </a:p>
+          </p:txBody>
+        </p:sp>
+        <p:sp>
+          <p:nvSpPr>
+            <p:cNvPr id="8" name="Arrow: Down 7">
+              <a:extLst>
+                <a:ext uri="{FF2B5EF4-FFF2-40B4-BE49-F238E27FC236}">
+                  <a16:creationId xmlns:a16="http://schemas.microsoft.com/office/drawing/2014/main" id="{490697C4-1D52-44B3-9145-1E4126021820}"/>
+                </a:ext>
+              </a:extLst>
+            </p:cNvPr>
+            <p:cNvSpPr/>
+            <p:nvPr/>
+          </p:nvSpPr>
+          <p:spPr>
+            <a:xfrm rot="16200000">
+              <a:off x="410999" y="5710180"/>
+              <a:ext cx="469783" cy="620786"/>
+            </a:xfrm>
+            <a:prstGeom prst="downArrow">
+              <a:avLst/>
+            </a:prstGeom>
+          </p:spPr>
+          <p:style>
+            <a:lnRef idx="2">
+              <a:schemeClr val="accent1">
+                <a:shade val="50000"/>
+              </a:schemeClr>
+            </a:lnRef>
+            <a:fillRef idx="1">
+              <a:schemeClr val="accent1"/>
+            </a:fillRef>
+            <a:effectRef idx="0">
+              <a:schemeClr val="accent1"/>
+            </a:effectRef>
+            <a:fontRef idx="minor">
+              <a:schemeClr val="lt1"/>
+            </a:fontRef>
+          </p:style>
+          <p:txBody>
+            <a:bodyPr rtlCol="0" anchor="ctr"/>
+            <a:lstStyle/>
+            <a:p>
+              <a:pPr algn="ctr"/>
+              <a:endParaRPr lang="en-GB" dirty="0"/>
+            </a:p>
+          </p:txBody>
+        </p:sp>
+      </p:grpSp>
     </p:spTree>
     <p:extLst>
       <p:ext uri="{BB962C8B-B14F-4D97-AF65-F5344CB8AC3E}">
@@ -5137,7 +5248,7 @@
             <a:effectLst/>
             <a:extLst>
               <a:ext uri="{AF507438-7753-43e0-B8FC-AC1667EBCBE1}">
-                <a14:hiddenEffects xmlns:a14="http://schemas.microsoft.com/office/drawing/2010/main" xmlns="">
+                <a14:hiddenEffects xmlns="" xmlns:a14="http://schemas.microsoft.com/office/drawing/2010/main">
                   <a:effectLst>
                     <a:outerShdw dist="35921" dir="2700000" algn="ctr" rotWithShape="0">
                       <a:schemeClr val="bg2"/>
@@ -5199,7 +5310,7 @@
             <a:effectLst/>
             <a:extLst>
               <a:ext uri="{AF507438-7753-43e0-B8FC-AC1667EBCBE1}">
-                <a14:hiddenEffects xmlns:a14="http://schemas.microsoft.com/office/drawing/2010/main" xmlns="">
+                <a14:hiddenEffects xmlns="" xmlns:a14="http://schemas.microsoft.com/office/drawing/2010/main">
                   <a:effectLst>
                     <a:outerShdw dist="35921" dir="2700000" algn="ctr" rotWithShape="0">
                       <a:schemeClr val="bg2"/>
@@ -5261,7 +5372,7 @@
             <a:effectLst/>
             <a:extLst>
               <a:ext uri="{AF507438-7753-43e0-B8FC-AC1667EBCBE1}">
-                <a14:hiddenEffects xmlns:a14="http://schemas.microsoft.com/office/drawing/2010/main" xmlns="">
+                <a14:hiddenEffects xmlns="" xmlns:a14="http://schemas.microsoft.com/office/drawing/2010/main">
                   <a:effectLst>
                     <a:outerShdw dist="35921" dir="2700000" algn="ctr" rotWithShape="0">
                       <a:schemeClr val="bg2"/>
@@ -5467,7 +5578,7 @@
           <a:effectLst/>
           <a:extLst>
             <a:ext uri="{AF507438-7753-43e0-B8FC-AC1667EBCBE1}">
-              <a14:hiddenEffects xmlns:a14="http://schemas.microsoft.com/office/drawing/2010/main" xmlns="">
+              <a14:hiddenEffects xmlns="" xmlns:a14="http://schemas.microsoft.com/office/drawing/2010/main">
                 <a:effectLst>
                   <a:outerShdw dist="35921" dir="2700000" algn="ctr" rotWithShape="0">
                     <a:schemeClr val="bg2"/>
@@ -5798,7 +5909,7 @@
             <a:effectLst/>
             <a:extLst>
               <a:ext uri="{AF507438-7753-43e0-B8FC-AC1667EBCBE1}">
-                <a14:hiddenEffects xmlns:a14="http://schemas.microsoft.com/office/drawing/2010/main" xmlns="">
+                <a14:hiddenEffects xmlns="" xmlns:a14="http://schemas.microsoft.com/office/drawing/2010/main">
                   <a:effectLst>
                     <a:outerShdw dist="35921" dir="2700000" algn="ctr" rotWithShape="0">
                       <a:schemeClr val="bg2"/>
@@ -5860,7 +5971,7 @@
             <a:effectLst/>
             <a:extLst>
               <a:ext uri="{AF507438-7753-43e0-B8FC-AC1667EBCBE1}">
-                <a14:hiddenEffects xmlns:a14="http://schemas.microsoft.com/office/drawing/2010/main" xmlns="">
+                <a14:hiddenEffects xmlns="" xmlns:a14="http://schemas.microsoft.com/office/drawing/2010/main">
                   <a:effectLst>
                     <a:outerShdw dist="35921" dir="2700000" algn="ctr" rotWithShape="0">
                       <a:schemeClr val="bg2"/>
@@ -5937,7 +6048,7 @@
             <a:effectLst/>
             <a:extLst>
               <a:ext uri="{AF507438-7753-43e0-B8FC-AC1667EBCBE1}">
-                <a14:hiddenEffects xmlns:a14="http://schemas.microsoft.com/office/drawing/2010/main" xmlns="">
+                <a14:hiddenEffects xmlns="" xmlns:a14="http://schemas.microsoft.com/office/drawing/2010/main">
                   <a:effectLst>
                     <a:outerShdw dist="35921" dir="2700000" algn="ctr" rotWithShape="0">
                       <a:schemeClr val="bg2"/>
@@ -5999,7 +6110,7 @@
             <a:effectLst/>
             <a:extLst>
               <a:ext uri="{AF507438-7753-43e0-B8FC-AC1667EBCBE1}">
-                <a14:hiddenEffects xmlns:a14="http://schemas.microsoft.com/office/drawing/2010/main" xmlns="">
+                <a14:hiddenEffects xmlns="" xmlns:a14="http://schemas.microsoft.com/office/drawing/2010/main">
                   <a:effectLst>
                     <a:outerShdw dist="35921" dir="2700000" algn="ctr" rotWithShape="0">
                       <a:schemeClr val="bg2"/>
@@ -7232,7 +7343,7 @@
           <a:effectLst/>
           <a:extLst>
             <a:ext uri="{AF507438-7753-43e0-B8FC-AC1667EBCBE1}">
-              <a14:hiddenEffects xmlns:a14="http://schemas.microsoft.com/office/drawing/2010/main" xmlns="">
+              <a14:hiddenEffects xmlns="" xmlns:a14="http://schemas.microsoft.com/office/drawing/2010/main">
                 <a:effectLst>
                   <a:outerShdw dist="35921" dir="2700000" algn="ctr" rotWithShape="0">
                     <a:schemeClr val="bg2"/>
@@ -11297,7 +11408,7 @@
                 <a14:useLocalDpi xmlns:a14="http://schemas.microsoft.com/office/drawing/2010/main" val="0"/>
               </a:ext>
               <a:ext uri="{96DAC541-7B7A-43D3-8B79-37D633B846F1}">
-                <asvg:svgBlip xmlns:asvg="http://schemas.microsoft.com/office/drawing/2016/SVG/main" xmlns="" r:embed="rId3"/>
+                <asvg:svgBlip xmlns="" xmlns:asvg="http://schemas.microsoft.com/office/drawing/2016/SVG/main" r:embed="rId3"/>
               </a:ext>
             </a:extLst>
           </a:blip>
@@ -11336,7 +11447,7 @@
                 <a14:useLocalDpi xmlns:a14="http://schemas.microsoft.com/office/drawing/2010/main" val="0"/>
               </a:ext>
               <a:ext uri="{96DAC541-7B7A-43D3-8B79-37D633B846F1}">
-                <asvg:svgBlip xmlns:asvg="http://schemas.microsoft.com/office/drawing/2016/SVG/main" xmlns="" r:embed="rId5"/>
+                <asvg:svgBlip xmlns="" xmlns:asvg="http://schemas.microsoft.com/office/drawing/2016/SVG/main" r:embed="rId5"/>
               </a:ext>
             </a:extLst>
           </a:blip>
@@ -11375,7 +11486,7 @@
                 <a14:useLocalDpi xmlns:a14="http://schemas.microsoft.com/office/drawing/2010/main" val="0"/>
               </a:ext>
               <a:ext uri="{96DAC541-7B7A-43D3-8B79-37D633B846F1}">
-                <asvg:svgBlip xmlns:asvg="http://schemas.microsoft.com/office/drawing/2016/SVG/main" xmlns="" r:embed="rId7"/>
+                <asvg:svgBlip xmlns="" xmlns:asvg="http://schemas.microsoft.com/office/drawing/2016/SVG/main" r:embed="rId7"/>
               </a:ext>
             </a:extLst>
           </a:blip>
@@ -11414,7 +11525,7 @@
                 <a14:useLocalDpi xmlns:a14="http://schemas.microsoft.com/office/drawing/2010/main" val="0"/>
               </a:ext>
               <a:ext uri="{96DAC541-7B7A-43D3-8B79-37D633B846F1}">
-                <asvg:svgBlip xmlns:asvg="http://schemas.microsoft.com/office/drawing/2016/SVG/main" xmlns="" r:embed="rId9"/>
+                <asvg:svgBlip xmlns="" xmlns:asvg="http://schemas.microsoft.com/office/drawing/2016/SVG/main" r:embed="rId9"/>
               </a:ext>
             </a:extLst>
           </a:blip>
@@ -11453,7 +11564,7 @@
                 <a14:useLocalDpi xmlns:a14="http://schemas.microsoft.com/office/drawing/2010/main" val="0"/>
               </a:ext>
               <a:ext uri="{96DAC541-7B7A-43D3-8B79-37D633B846F1}">
-                <asvg:svgBlip xmlns:asvg="http://schemas.microsoft.com/office/drawing/2016/SVG/main" xmlns="" r:embed="rId11"/>
+                <asvg:svgBlip xmlns="" xmlns:asvg="http://schemas.microsoft.com/office/drawing/2016/SVG/main" r:embed="rId11"/>
               </a:ext>
             </a:extLst>
           </a:blip>
@@ -11492,7 +11603,7 @@
                 <a14:useLocalDpi xmlns:a14="http://schemas.microsoft.com/office/drawing/2010/main" val="0"/>
               </a:ext>
               <a:ext uri="{96DAC541-7B7A-43D3-8B79-37D633B846F1}">
-                <asvg:svgBlip xmlns:asvg="http://schemas.microsoft.com/office/drawing/2016/SVG/main" xmlns="" r:embed="rId13"/>
+                <asvg:svgBlip xmlns="" xmlns:asvg="http://schemas.microsoft.com/office/drawing/2016/SVG/main" r:embed="rId13"/>
               </a:ext>
             </a:extLst>
           </a:blip>
@@ -11856,7 +11967,7 @@
                 <a14:useLocalDpi xmlns:a14="http://schemas.microsoft.com/office/drawing/2010/main" val="0"/>
               </a:ext>
               <a:ext uri="{96DAC541-7B7A-43D3-8B79-37D633B846F1}">
-                <asvg:svgBlip xmlns:asvg="http://schemas.microsoft.com/office/drawing/2016/SVG/main" xmlns="" r:embed="rId3"/>
+                <asvg:svgBlip xmlns="" xmlns:asvg="http://schemas.microsoft.com/office/drawing/2016/SVG/main" r:embed="rId3"/>
               </a:ext>
             </a:extLst>
           </a:blip>
@@ -12071,7 +12182,7 @@
                 <a14:useLocalDpi xmlns:a14="http://schemas.microsoft.com/office/drawing/2010/main" val="0"/>
               </a:ext>
               <a:ext uri="{96DAC541-7B7A-43D3-8B79-37D633B846F1}">
-                <asvg:svgBlip xmlns:asvg="http://schemas.microsoft.com/office/drawing/2016/SVG/main" xmlns="" r:embed="rId3"/>
+                <asvg:svgBlip xmlns="" xmlns:asvg="http://schemas.microsoft.com/office/drawing/2016/SVG/main" r:embed="rId3"/>
               </a:ext>
             </a:extLst>
           </a:blip>

</xml_diff>

<commit_message>
Tools for olverlords revised
</commit_message>
<xml_diff>
--- a/instructors/01-Why_are_we_here.pptx
+++ b/instructors/01-Why_are_we_here.pptx
@@ -3847,117 +3847,42 @@
           </a:p>
         </p:txBody>
       </p:sp>
-      <p:grpSp>
-        <p:nvGrpSpPr>
-          <p:cNvPr id="6" name="Group 5"/>
-          <p:cNvGrpSpPr/>
+      <p:sp>
+        <p:nvSpPr>
+          <p:cNvPr id="7" name="TextBox 6">
+            <a:extLst>
+              <a:ext uri="{FF2B5EF4-FFF2-40B4-BE49-F238E27FC236}">
+                <a16:creationId xmlns:a16="http://schemas.microsoft.com/office/drawing/2014/main" id="{441D6036-BCDA-4EC7-9653-F205FE226493}"/>
+              </a:ext>
+            </a:extLst>
+          </p:cNvPr>
+          <p:cNvSpPr txBox="1"/>
           <p:nvPr/>
-        </p:nvGrpSpPr>
-        <p:grpSpPr>
+        </p:nvSpPr>
+        <p:spPr>
           <a:xfrm>
-            <a:off x="335498" y="5785681"/>
-            <a:ext cx="7747345" cy="469783"/>
-            <a:chOff x="335498" y="5785681"/>
-            <a:chExt cx="7747345" cy="469783"/>
+            <a:off x="1092764" y="5835907"/>
+            <a:ext cx="6990079" cy="369332"/>
           </a:xfrm>
-        </p:grpSpPr>
-        <p:sp>
-          <p:nvSpPr>
-            <p:cNvPr id="7" name="TextBox 6">
-              <a:extLst>
-                <a:ext uri="{FF2B5EF4-FFF2-40B4-BE49-F238E27FC236}">
-                  <a16:creationId xmlns:a16="http://schemas.microsoft.com/office/drawing/2014/main" id="{441D6036-BCDA-4EC7-9653-F205FE226493}"/>
-                </a:ext>
-              </a:extLst>
-            </p:cNvPr>
-            <p:cNvSpPr txBox="1"/>
-            <p:nvPr/>
-          </p:nvSpPr>
-          <p:spPr>
-            <a:xfrm>
-              <a:off x="1092764" y="5835907"/>
-              <a:ext cx="6990079" cy="369332"/>
-            </a:xfrm>
-            <a:prstGeom prst="rect">
-              <a:avLst/>
-            </a:prstGeom>
-            <a:noFill/>
-          </p:spPr>
-          <p:txBody>
-            <a:bodyPr wrap="square">
-              <a:spAutoFit/>
-            </a:bodyPr>
-            <a:lstStyle/>
-            <a:p>
-              <a:r>
-                <a:rPr lang="en-GB"/>
-                <a:t>Open </a:t>
-              </a:r>
-              <a:r>
-                <a:rPr lang="en-GB" smtClean="0">
-                  <a:hlinkClick r:id="rId2"/>
-                </a:rPr>
-                <a:t>https://pad.carpentries.org/fair-4-leaders-begins-20YY-MM-DD</a:t>
-              </a:r>
-              <a:r>
-                <a:rPr lang="en-GB" smtClean="0"/>
-                <a:t>  </a:t>
-              </a:r>
-              <a:endParaRPr lang="en-GB" dirty="0">
-                <a:highlight>
-                  <a:srgbClr val="FFFF00"/>
-                </a:highlight>
-              </a:endParaRPr>
-            </a:p>
-          </p:txBody>
-        </p:sp>
-        <p:sp>
-          <p:nvSpPr>
-            <p:cNvPr id="8" name="Arrow: Down 7">
-              <a:extLst>
-                <a:ext uri="{FF2B5EF4-FFF2-40B4-BE49-F238E27FC236}">
-                  <a16:creationId xmlns:a16="http://schemas.microsoft.com/office/drawing/2014/main" id="{490697C4-1D52-44B3-9145-1E4126021820}"/>
-                </a:ext>
-              </a:extLst>
-            </p:cNvPr>
-            <p:cNvSpPr/>
-            <p:nvPr/>
-          </p:nvSpPr>
-          <p:spPr>
-            <a:xfrm rot="16200000">
-              <a:off x="410999" y="5710180"/>
-              <a:ext cx="469783" cy="620786"/>
-            </a:xfrm>
-            <a:prstGeom prst="downArrow">
-              <a:avLst/>
-            </a:prstGeom>
-          </p:spPr>
-          <p:style>
-            <a:lnRef idx="2">
-              <a:schemeClr val="accent1">
-                <a:shade val="50000"/>
-              </a:schemeClr>
-            </a:lnRef>
-            <a:fillRef idx="1">
-              <a:schemeClr val="accent1"/>
-            </a:fillRef>
-            <a:effectRef idx="0">
-              <a:schemeClr val="accent1"/>
-            </a:effectRef>
-            <a:fontRef idx="minor">
-              <a:schemeClr val="lt1"/>
-            </a:fontRef>
-          </p:style>
-          <p:txBody>
-            <a:bodyPr rtlCol="0" anchor="ctr"/>
-            <a:lstStyle/>
-            <a:p>
-              <a:pPr algn="ctr"/>
-              <a:endParaRPr lang="en-GB" dirty="0"/>
-            </a:p>
-          </p:txBody>
-        </p:sp>
-      </p:grpSp>
+          <a:prstGeom prst="rect">
+            <a:avLst/>
+          </a:prstGeom>
+          <a:noFill/>
+        </p:spPr>
+        <p:txBody>
+          <a:bodyPr wrap="square">
+            <a:spAutoFit/>
+          </a:bodyPr>
+          <a:lstStyle/>
+          <a:p>
+            <a:endParaRPr lang="en-GB" dirty="0">
+              <a:highlight>
+                <a:srgbClr val="FFFF00"/>
+              </a:highlight>
+            </a:endParaRPr>
+          </a:p>
+        </p:txBody>
+      </p:sp>
     </p:spTree>
     <p:extLst>
       <p:ext uri="{BB962C8B-B14F-4D97-AF65-F5344CB8AC3E}">
@@ -4157,7 +4082,7 @@
                 <a14:useLocalDpi xmlns:a14="http://schemas.microsoft.com/office/drawing/2010/main" val="0"/>
               </a:ext>
               <a:ext uri="{96DAC541-7B7A-43D3-8B79-37D633B846F1}">
-                <asvg:svgBlip xmlns="" xmlns:asvg="http://schemas.microsoft.com/office/drawing/2016/SVG/main" r:embed="rId3"/>
+                <asvg:svgBlip xmlns:asvg="http://schemas.microsoft.com/office/drawing/2016/SVG/main" xmlns="" r:embed="rId3"/>
               </a:ext>
             </a:extLst>
           </a:blip>
@@ -4296,7 +4221,7 @@
                 <a14:useLocalDpi xmlns:a14="http://schemas.microsoft.com/office/drawing/2010/main" val="0"/>
               </a:ext>
               <a:ext uri="{96DAC541-7B7A-43D3-8B79-37D633B846F1}">
-                <asvg:svgBlip xmlns:asvg="http://schemas.microsoft.com/office/drawing/2016/SVG/main" xmlns="" r:embed="rId3"/>
+                <asvg:svgBlip xmlns="" xmlns:asvg="http://schemas.microsoft.com/office/drawing/2016/SVG/main" r:embed="rId3"/>
               </a:ext>
             </a:extLst>
           </a:blip>
@@ -4511,7 +4436,7 @@
                 <a14:useLocalDpi xmlns:a14="http://schemas.microsoft.com/office/drawing/2010/main" val="0"/>
               </a:ext>
               <a:ext uri="{96DAC541-7B7A-43D3-8B79-37D633B846F1}">
-                <asvg:svgBlip xmlns:asvg="http://schemas.microsoft.com/office/drawing/2016/SVG/main" xmlns="" r:embed="rId3"/>
+                <asvg:svgBlip xmlns="" xmlns:asvg="http://schemas.microsoft.com/office/drawing/2016/SVG/main" r:embed="rId3"/>
               </a:ext>
             </a:extLst>
           </a:blip>
@@ -5822,7 +5747,7 @@
             <a:effectLst/>
             <a:extLst>
               <a:ext uri="{AF507438-7753-43e0-B8FC-AC1667EBCBE1}">
-                <a14:hiddenEffects xmlns:a14="http://schemas.microsoft.com/office/drawing/2010/main" xmlns="">
+                <a14:hiddenEffects xmlns="" xmlns:a14="http://schemas.microsoft.com/office/drawing/2010/main">
                   <a:effectLst>
                     <a:outerShdw dist="35921" dir="2700000" algn="ctr" rotWithShape="0">
                       <a:schemeClr val="bg2"/>
@@ -5884,7 +5809,7 @@
             <a:effectLst/>
             <a:extLst>
               <a:ext uri="{AF507438-7753-43e0-B8FC-AC1667EBCBE1}">
-                <a14:hiddenEffects xmlns:a14="http://schemas.microsoft.com/office/drawing/2010/main" xmlns="">
+                <a14:hiddenEffects xmlns="" xmlns:a14="http://schemas.microsoft.com/office/drawing/2010/main">
                   <a:effectLst>
                     <a:outerShdw dist="35921" dir="2700000" algn="ctr" rotWithShape="0">
                       <a:schemeClr val="bg2"/>
@@ -5946,7 +5871,7 @@
             <a:effectLst/>
             <a:extLst>
               <a:ext uri="{AF507438-7753-43e0-B8FC-AC1667EBCBE1}">
-                <a14:hiddenEffects xmlns:a14="http://schemas.microsoft.com/office/drawing/2010/main" xmlns="">
+                <a14:hiddenEffects xmlns="" xmlns:a14="http://schemas.microsoft.com/office/drawing/2010/main">
                   <a:effectLst>
                     <a:outerShdw dist="35921" dir="2700000" algn="ctr" rotWithShape="0">
                       <a:schemeClr val="bg2"/>
@@ -6152,7 +6077,7 @@
           <a:effectLst/>
           <a:extLst>
             <a:ext uri="{AF507438-7753-43e0-B8FC-AC1667EBCBE1}">
-              <a14:hiddenEffects xmlns:a14="http://schemas.microsoft.com/office/drawing/2010/main" xmlns="">
+              <a14:hiddenEffects xmlns="" xmlns:a14="http://schemas.microsoft.com/office/drawing/2010/main">
                 <a:effectLst>
                   <a:outerShdw dist="35921" dir="2700000" algn="ctr" rotWithShape="0">
                     <a:schemeClr val="bg2"/>
@@ -6483,7 +6408,7 @@
             <a:effectLst/>
             <a:extLst>
               <a:ext uri="{AF507438-7753-43e0-B8FC-AC1667EBCBE1}">
-                <a14:hiddenEffects xmlns:a14="http://schemas.microsoft.com/office/drawing/2010/main" xmlns="">
+                <a14:hiddenEffects xmlns="" xmlns:a14="http://schemas.microsoft.com/office/drawing/2010/main">
                   <a:effectLst>
                     <a:outerShdw dist="35921" dir="2700000" algn="ctr" rotWithShape="0">
                       <a:schemeClr val="bg2"/>
@@ -6545,7 +6470,7 @@
             <a:effectLst/>
             <a:extLst>
               <a:ext uri="{AF507438-7753-43e0-B8FC-AC1667EBCBE1}">
-                <a14:hiddenEffects xmlns:a14="http://schemas.microsoft.com/office/drawing/2010/main" xmlns="">
+                <a14:hiddenEffects xmlns="" xmlns:a14="http://schemas.microsoft.com/office/drawing/2010/main">
                   <a:effectLst>
                     <a:outerShdw dist="35921" dir="2700000" algn="ctr" rotWithShape="0">
                       <a:schemeClr val="bg2"/>
@@ -6622,7 +6547,7 @@
             <a:effectLst/>
             <a:extLst>
               <a:ext uri="{AF507438-7753-43e0-B8FC-AC1667EBCBE1}">
-                <a14:hiddenEffects xmlns:a14="http://schemas.microsoft.com/office/drawing/2010/main" xmlns="">
+                <a14:hiddenEffects xmlns="" xmlns:a14="http://schemas.microsoft.com/office/drawing/2010/main">
                   <a:effectLst>
                     <a:outerShdw dist="35921" dir="2700000" algn="ctr" rotWithShape="0">
                       <a:schemeClr val="bg2"/>
@@ -6684,7 +6609,7 @@
             <a:effectLst/>
             <a:extLst>
               <a:ext uri="{AF507438-7753-43e0-B8FC-AC1667EBCBE1}">
-                <a14:hiddenEffects xmlns:a14="http://schemas.microsoft.com/office/drawing/2010/main" xmlns="">
+                <a14:hiddenEffects xmlns="" xmlns:a14="http://schemas.microsoft.com/office/drawing/2010/main">
                   <a:effectLst>
                     <a:outerShdw dist="35921" dir="2700000" algn="ctr" rotWithShape="0">
                       <a:schemeClr val="bg2"/>
@@ -7917,7 +7842,7 @@
           <a:effectLst/>
           <a:extLst>
             <a:ext uri="{AF507438-7753-43e0-B8FC-AC1667EBCBE1}">
-              <a14:hiddenEffects xmlns:a14="http://schemas.microsoft.com/office/drawing/2010/main" xmlns="">
+              <a14:hiddenEffects xmlns="" xmlns:a14="http://schemas.microsoft.com/office/drawing/2010/main">
                 <a:effectLst>
                   <a:outerShdw dist="35921" dir="2700000" algn="ctr" rotWithShape="0">
                     <a:schemeClr val="bg2"/>
@@ -10897,22 +10822,16 @@
               <a:rPr lang="pl-PL" sz="1400" dirty="0">
                 <a:hlinkClick r:id="rId2"/>
               </a:rPr>
-              <a:t>https</a:t>
-            </a:r>
-            <a:r>
-              <a:rPr lang="pl-PL" sz="1400">
-                <a:hlinkClick r:id="rId2"/>
-              </a:rPr>
-              <a:t>://</a:t>
-            </a:r>
-            <a:r>
-              <a:rPr lang="pl-PL" sz="1400" smtClean="0">
+              <a:t>https://</a:t>
+            </a:r>
+            <a:r>
+              <a:rPr lang="pl-PL" sz="1400" dirty="0" smtClean="0">
                 <a:hlinkClick r:id="rId2"/>
               </a:rPr>
               <a:t>www.fosteropenscience.eu/content/what-open-science-introduction</a:t>
             </a:r>
             <a:r>
-              <a:rPr lang="en-GB" sz="1400" smtClean="0"/>
+              <a:rPr lang="en-GB" sz="1400" dirty="0" smtClean="0"/>
               <a:t> </a:t>
             </a:r>
             <a:endParaRPr lang="pl-PL" sz="1400" dirty="0"/>
@@ -11050,11 +10969,7 @@
           <a:p>
             <a:r>
               <a:rPr lang="pl-PL" sz="1400" dirty="0" smtClean="0"/>
-              <a:t>[3</a:t>
-            </a:r>
-            <a:r>
-              <a:rPr lang="pl-PL" sz="1400" smtClean="0"/>
-              <a:t>] Photo Jonathunder, Medal</a:t>
+              <a:t>[3] Photo Jonathunder, Medal</a:t>
             </a:r>
             <a:r>
               <a:rPr lang="pl-PL" sz="1400" dirty="0"/>
@@ -11146,31 +11061,25 @@
               <a:rPr lang="pl-PL" sz="1400" dirty="0">
                 <a:hlinkClick r:id="rId8"/>
               </a:rPr>
-              <a:t>https://</a:t>
-            </a:r>
-            <a:r>
-              <a:rPr lang="pl-PL" sz="1400">
-                <a:hlinkClick r:id="rId8"/>
-              </a:rPr>
-              <a:t>sfdora.org/resource/dora-slide-presentations</a:t>
-            </a:r>
-            <a:r>
-              <a:rPr lang="pl-PL" sz="1400" smtClean="0">
+              <a:t>https://sfdora.org/resource/dora-slide-presentations</a:t>
+            </a:r>
+            <a:r>
+              <a:rPr lang="pl-PL" sz="1400" dirty="0" smtClean="0">
                 <a:hlinkClick r:id="rId8"/>
               </a:rPr>
               <a:t>/</a:t>
             </a:r>
-            <a:endParaRPr lang="en-GB" sz="1400" smtClean="0"/>
-          </a:p>
-          <a:p>
-            <a:endParaRPr lang="en-GB" sz="1400"/>
+            <a:endParaRPr lang="en-GB" sz="1400" dirty="0" smtClean="0"/>
+          </a:p>
+          <a:p>
+            <a:endParaRPr lang="en-GB" sz="1400" dirty="0"/>
           </a:p>
           <a:p>
             <a:pPr marL="0" indent="0">
               <a:buNone/>
             </a:pPr>
             <a:r>
-              <a:rPr lang="en-GB" sz="2000" smtClean="0"/>
+              <a:rPr lang="en-GB" sz="2000" dirty="0" smtClean="0"/>
               <a:t>Funding</a:t>
             </a:r>
           </a:p>
@@ -11179,11 +11088,19 @@
               <a:buNone/>
             </a:pPr>
             <a:r>
-              <a:rPr lang="en-GB" sz="1400" smtClean="0"/>
-              <a:t>Ed-DaSH </a:t>
-            </a:r>
-            <a:r>
-              <a:rPr lang="en-GB" sz="1400"/>
+              <a:rPr lang="en-GB" sz="1400" dirty="0" smtClean="0"/>
+              <a:t>Ed-</a:t>
+            </a:r>
+            <a:r>
+              <a:rPr lang="en-GB" sz="1400" dirty="0" err="1" smtClean="0"/>
+              <a:t>DaSH</a:t>
+            </a:r>
+            <a:r>
+              <a:rPr lang="en-GB" sz="1400" dirty="0" smtClean="0"/>
+              <a:t> </a:t>
+            </a:r>
+            <a:r>
+              <a:rPr lang="en-GB" sz="1400" dirty="0"/>
               <a:t>is a Data Science training programme for Health and Biosciences. This work was supported by UK Research and Innovation [grant number MR/V039075/1].</a:t>
             </a:r>
           </a:p>
@@ -11192,25 +11109,25 @@
               <a:buNone/>
             </a:pPr>
             <a:r>
-              <a:rPr lang="en-GB" sz="1400" smtClean="0">
+              <a:rPr lang="en-GB" sz="1400" dirty="0" smtClean="0">
                 <a:hlinkClick r:id="rId9"/>
               </a:rPr>
               <a:t>https</a:t>
             </a:r>
             <a:r>
-              <a:rPr lang="en-GB" sz="1400">
+              <a:rPr lang="en-GB" sz="1400" dirty="0">
                 <a:hlinkClick r:id="rId9"/>
               </a:rPr>
               <a:t>://edcarp.github.io/Ed-DaSH</a:t>
             </a:r>
             <a:r>
-              <a:rPr lang="en-GB" sz="1400" smtClean="0">
+              <a:rPr lang="en-GB" sz="1400" dirty="0" smtClean="0">
                 <a:hlinkClick r:id="rId9"/>
               </a:rPr>
               <a:t>/</a:t>
             </a:r>
             <a:r>
-              <a:rPr lang="en-GB" sz="1400" smtClean="0"/>
+              <a:rPr lang="en-GB" sz="1400" dirty="0" smtClean="0"/>
               <a:t> </a:t>
             </a:r>
             <a:endParaRPr lang="pl-PL" sz="1400" dirty="0" smtClean="0"/>
@@ -11978,7 +11895,7 @@
                 <a14:useLocalDpi xmlns:a14="http://schemas.microsoft.com/office/drawing/2010/main" val="0"/>
               </a:ext>
               <a:ext uri="{96DAC541-7B7A-43D3-8B79-37D633B846F1}">
-                <asvg:svgBlip xmlns:asvg="http://schemas.microsoft.com/office/drawing/2016/SVG/main" xmlns="" r:embed="rId3"/>
+                <asvg:svgBlip xmlns="" xmlns:asvg="http://schemas.microsoft.com/office/drawing/2016/SVG/main" r:embed="rId3"/>
               </a:ext>
             </a:extLst>
           </a:blip>
@@ -12017,7 +11934,7 @@
                 <a14:useLocalDpi xmlns:a14="http://schemas.microsoft.com/office/drawing/2010/main" val="0"/>
               </a:ext>
               <a:ext uri="{96DAC541-7B7A-43D3-8B79-37D633B846F1}">
-                <asvg:svgBlip xmlns:asvg="http://schemas.microsoft.com/office/drawing/2016/SVG/main" xmlns="" r:embed="rId5"/>
+                <asvg:svgBlip xmlns="" xmlns:asvg="http://schemas.microsoft.com/office/drawing/2016/SVG/main" r:embed="rId5"/>
               </a:ext>
             </a:extLst>
           </a:blip>
@@ -12056,7 +11973,7 @@
                 <a14:useLocalDpi xmlns:a14="http://schemas.microsoft.com/office/drawing/2010/main" val="0"/>
               </a:ext>
               <a:ext uri="{96DAC541-7B7A-43D3-8B79-37D633B846F1}">
-                <asvg:svgBlip xmlns:asvg="http://schemas.microsoft.com/office/drawing/2016/SVG/main" xmlns="" r:embed="rId7"/>
+                <asvg:svgBlip xmlns="" xmlns:asvg="http://schemas.microsoft.com/office/drawing/2016/SVG/main" r:embed="rId7"/>
               </a:ext>
             </a:extLst>
           </a:blip>
@@ -12095,7 +12012,7 @@
                 <a14:useLocalDpi xmlns:a14="http://schemas.microsoft.com/office/drawing/2010/main" val="0"/>
               </a:ext>
               <a:ext uri="{96DAC541-7B7A-43D3-8B79-37D633B846F1}">
-                <asvg:svgBlip xmlns:asvg="http://schemas.microsoft.com/office/drawing/2016/SVG/main" xmlns="" r:embed="rId9"/>
+                <asvg:svgBlip xmlns="" xmlns:asvg="http://schemas.microsoft.com/office/drawing/2016/SVG/main" r:embed="rId9"/>
               </a:ext>
             </a:extLst>
           </a:blip>
@@ -12134,7 +12051,7 @@
                 <a14:useLocalDpi xmlns:a14="http://schemas.microsoft.com/office/drawing/2010/main" val="0"/>
               </a:ext>
               <a:ext uri="{96DAC541-7B7A-43D3-8B79-37D633B846F1}">
-                <asvg:svgBlip xmlns:asvg="http://schemas.microsoft.com/office/drawing/2016/SVG/main" xmlns="" r:embed="rId11"/>
+                <asvg:svgBlip xmlns="" xmlns:asvg="http://schemas.microsoft.com/office/drawing/2016/SVG/main" r:embed="rId11"/>
               </a:ext>
             </a:extLst>
           </a:blip>
@@ -12173,7 +12090,7 @@
                 <a14:useLocalDpi xmlns:a14="http://schemas.microsoft.com/office/drawing/2010/main" val="0"/>
               </a:ext>
               <a:ext uri="{96DAC541-7B7A-43D3-8B79-37D633B846F1}">
-                <asvg:svgBlip xmlns:asvg="http://schemas.microsoft.com/office/drawing/2016/SVG/main" xmlns="" r:embed="rId13"/>
+                <asvg:svgBlip xmlns="" xmlns:asvg="http://schemas.microsoft.com/office/drawing/2016/SVG/main" r:embed="rId13"/>
               </a:ext>
             </a:extLst>
           </a:blip>

</xml_diff>